<commit_message>
diverse improvements of image data modules
</commit_message>
<xml_diff>
--- a/figures/resources/image_file_formats.pptx
+++ b/figures/resources/image_file_formats.pptx
@@ -7,6 +7,7 @@
   <p:sldIdLst>
     <p:sldId id="256" r:id="rId2"/>
     <p:sldId id="257" r:id="rId3"/>
+    <p:sldId id="258" r:id="rId4"/>
   </p:sldIdLst>
   <p:sldSz cx="12192000" cy="6858000"/>
   <p:notesSz cx="6858000" cy="9144000"/>
@@ -105,6 +106,11 @@
       </a:defRPr>
     </a:lvl9pPr>
   </p:defaultTextStyle>
+  <p:extLst>
+    <p:ext uri="{EFAFB233-063F-42B5-8137-9DF3F51BA10A}">
+      <p15:sldGuideLst xmlns:p15="http://schemas.microsoft.com/office/powerpoint/2012/main"/>
+    </p:ext>
+  </p:extLst>
 </p:presentation>
 </file>
 
@@ -257,7 +263,7 @@
           <a:p>
             <a:fld id="{750C4F48-5AC2-ED47-9644-5F9E688EC8A9}" type="datetimeFigureOut">
               <a:rPr lang="de-DE" smtClean="0"/>
-              <a:t>03.01.22</a:t>
+              <a:t>16.09.24</a:t>
             </a:fld>
             <a:endParaRPr lang="de-DE"/>
           </a:p>
@@ -457,7 +463,7 @@
           <a:p>
             <a:fld id="{750C4F48-5AC2-ED47-9644-5F9E688EC8A9}" type="datetimeFigureOut">
               <a:rPr lang="de-DE" smtClean="0"/>
-              <a:t>03.01.22</a:t>
+              <a:t>16.09.24</a:t>
             </a:fld>
             <a:endParaRPr lang="de-DE"/>
           </a:p>
@@ -667,7 +673,7 @@
           <a:p>
             <a:fld id="{750C4F48-5AC2-ED47-9644-5F9E688EC8A9}" type="datetimeFigureOut">
               <a:rPr lang="de-DE" smtClean="0"/>
-              <a:t>03.01.22</a:t>
+              <a:t>16.09.24</a:t>
             </a:fld>
             <a:endParaRPr lang="de-DE"/>
           </a:p>
@@ -867,7 +873,7 @@
           <a:p>
             <a:fld id="{750C4F48-5AC2-ED47-9644-5F9E688EC8A9}" type="datetimeFigureOut">
               <a:rPr lang="de-DE" smtClean="0"/>
-              <a:t>03.01.22</a:t>
+              <a:t>16.09.24</a:t>
             </a:fld>
             <a:endParaRPr lang="de-DE"/>
           </a:p>
@@ -1143,7 +1149,7 @@
           <a:p>
             <a:fld id="{750C4F48-5AC2-ED47-9644-5F9E688EC8A9}" type="datetimeFigureOut">
               <a:rPr lang="de-DE" smtClean="0"/>
-              <a:t>03.01.22</a:t>
+              <a:t>16.09.24</a:t>
             </a:fld>
             <a:endParaRPr lang="de-DE"/>
           </a:p>
@@ -1411,7 +1417,7 @@
           <a:p>
             <a:fld id="{750C4F48-5AC2-ED47-9644-5F9E688EC8A9}" type="datetimeFigureOut">
               <a:rPr lang="de-DE" smtClean="0"/>
-              <a:t>03.01.22</a:t>
+              <a:t>16.09.24</a:t>
             </a:fld>
             <a:endParaRPr lang="de-DE"/>
           </a:p>
@@ -1826,7 +1832,7 @@
           <a:p>
             <a:fld id="{750C4F48-5AC2-ED47-9644-5F9E688EC8A9}" type="datetimeFigureOut">
               <a:rPr lang="de-DE" smtClean="0"/>
-              <a:t>03.01.22</a:t>
+              <a:t>16.09.24</a:t>
             </a:fld>
             <a:endParaRPr lang="de-DE"/>
           </a:p>
@@ -1968,7 +1974,7 @@
           <a:p>
             <a:fld id="{750C4F48-5AC2-ED47-9644-5F9E688EC8A9}" type="datetimeFigureOut">
               <a:rPr lang="de-DE" smtClean="0"/>
-              <a:t>03.01.22</a:t>
+              <a:t>16.09.24</a:t>
             </a:fld>
             <a:endParaRPr lang="de-DE"/>
           </a:p>
@@ -2081,7 +2087,7 @@
           <a:p>
             <a:fld id="{750C4F48-5AC2-ED47-9644-5F9E688EC8A9}" type="datetimeFigureOut">
               <a:rPr lang="de-DE" smtClean="0"/>
-              <a:t>03.01.22</a:t>
+              <a:t>16.09.24</a:t>
             </a:fld>
             <a:endParaRPr lang="de-DE"/>
           </a:p>
@@ -2394,7 +2400,7 @@
           <a:p>
             <a:fld id="{750C4F48-5AC2-ED47-9644-5F9E688EC8A9}" type="datetimeFigureOut">
               <a:rPr lang="de-DE" smtClean="0"/>
-              <a:t>03.01.22</a:t>
+              <a:t>16.09.24</a:t>
             </a:fld>
             <a:endParaRPr lang="de-DE"/>
           </a:p>
@@ -2683,7 +2689,7 @@
           <a:p>
             <a:fld id="{750C4F48-5AC2-ED47-9644-5F9E688EC8A9}" type="datetimeFigureOut">
               <a:rPr lang="de-DE" smtClean="0"/>
-              <a:t>03.01.22</a:t>
+              <a:t>16.09.24</a:t>
             </a:fld>
             <a:endParaRPr lang="de-DE"/>
           </a:p>
@@ -2926,7 +2932,7 @@
           <a:p>
             <a:fld id="{750C4F48-5AC2-ED47-9644-5F9E688EC8A9}" type="datetimeFigureOut">
               <a:rPr lang="de-DE" smtClean="0"/>
-              <a:t>03.01.22</a:t>
+              <a:t>16.09.24</a:t>
             </a:fld>
             <a:endParaRPr lang="de-DE"/>
           </a:p>
@@ -3529,6 +3535,1281 @@
 </p:sld>
 </file>
 
+<file path=ppt/slides/slide3.xml><?xml version="1.0" encoding="utf-8"?>
+<p:sld xmlns:a="http://schemas.openxmlformats.org/drawingml/2006/main" xmlns:r="http://schemas.openxmlformats.org/officeDocument/2006/relationships" xmlns:p="http://schemas.openxmlformats.org/presentationml/2006/main">
+  <p:cSld>
+    <p:spTree>
+      <p:nvGrpSpPr>
+        <p:cNvPr id="1" name=""/>
+        <p:cNvGrpSpPr/>
+        <p:nvPr/>
+      </p:nvGrpSpPr>
+      <p:grpSpPr>
+        <a:xfrm>
+          <a:off x="0" y="0"/>
+          <a:ext cx="0" cy="0"/>
+          <a:chOff x="0" y="0"/>
+          <a:chExt cx="0" cy="0"/>
+        </a:xfrm>
+      </p:grpSpPr>
+      <p:sp>
+        <p:nvSpPr>
+          <p:cNvPr id="4" name="TextBox 3">
+            <a:extLst>
+              <a:ext uri="{FF2B5EF4-FFF2-40B4-BE49-F238E27FC236}">
+                <a16:creationId xmlns:a16="http://schemas.microsoft.com/office/drawing/2014/main" id="{26115CA4-F504-D4F7-DEB3-4A4F108A82ED}"/>
+              </a:ext>
+            </a:extLst>
+          </p:cNvPr>
+          <p:cNvSpPr txBox="1"/>
+          <p:nvPr/>
+        </p:nvSpPr>
+        <p:spPr>
+          <a:xfrm>
+            <a:off x="1610879" y="1262206"/>
+            <a:ext cx="9999483" cy="307777"/>
+          </a:xfrm>
+          <a:prstGeom prst="rect">
+            <a:avLst/>
+          </a:prstGeom>
+          <a:noFill/>
+        </p:spPr>
+        <p:txBody>
+          <a:bodyPr wrap="square" rtlCol="0">
+            <a:spAutoFit/>
+          </a:bodyPr>
+          <a:lstStyle/>
+          <a:p>
+            <a:r>
+              <a:rPr lang="en-DE" sz="1400" dirty="0">
+                <a:latin typeface="Courier New" panose="02070309020205020404" pitchFamily="49" charset="0"/>
+                <a:cs typeface="Courier New" panose="02070309020205020404" pitchFamily="49" charset="0"/>
+              </a:rPr>
+              <a:t>011100...1001010010100010</a:t>
+            </a:r>
+            <a:r>
+              <a:rPr lang="en-DE" sz="1400" dirty="0">
+                <a:highlight>
+                  <a:srgbClr val="808000"/>
+                </a:highlight>
+                <a:latin typeface="Courier New" panose="02070309020205020404" pitchFamily="49" charset="0"/>
+                <a:cs typeface="Courier New" panose="02070309020205020404" pitchFamily="49" charset="0"/>
+              </a:rPr>
+              <a:t>00000000</a:t>
+            </a:r>
+            <a:r>
+              <a:rPr lang="en-DE" sz="1400" dirty="0">
+                <a:highlight>
+                  <a:srgbClr val="FFFF00"/>
+                </a:highlight>
+                <a:latin typeface="Courier New" panose="02070309020205020404" pitchFamily="49" charset="0"/>
+                <a:cs typeface="Courier New" panose="02070309020205020404" pitchFamily="49" charset="0"/>
+              </a:rPr>
+              <a:t>00001000</a:t>
+            </a:r>
+            <a:r>
+              <a:rPr lang="en-DE" sz="1400" dirty="0">
+                <a:highlight>
+                  <a:srgbClr val="008000"/>
+                </a:highlight>
+                <a:latin typeface="Courier New" panose="02070309020205020404" pitchFamily="49" charset="0"/>
+                <a:cs typeface="Courier New" panose="02070309020205020404" pitchFamily="49" charset="0"/>
+              </a:rPr>
+              <a:t>00000010</a:t>
+            </a:r>
+            <a:r>
+              <a:rPr lang="en-DE" sz="1400" dirty="0">
+                <a:highlight>
+                  <a:srgbClr val="00FFFF"/>
+                </a:highlight>
+                <a:latin typeface="Courier New" panose="02070309020205020404" pitchFamily="49" charset="0"/>
+                <a:cs typeface="Courier New" panose="02070309020205020404" pitchFamily="49" charset="0"/>
+              </a:rPr>
+              <a:t>00101010</a:t>
+            </a:r>
+            <a:r>
+              <a:rPr lang="en-DE" sz="1400" dirty="0">
+                <a:highlight>
+                  <a:srgbClr val="FF00FF"/>
+                </a:highlight>
+                <a:latin typeface="Courier New" panose="02070309020205020404" pitchFamily="49" charset="0"/>
+                <a:cs typeface="Courier New" panose="02070309020205020404" pitchFamily="49" charset="0"/>
+              </a:rPr>
+              <a:t>00001010</a:t>
+            </a:r>
+            <a:r>
+              <a:rPr lang="en-DE" sz="1400" dirty="0">
+                <a:latin typeface="Courier New" panose="02070309020205020404" pitchFamily="49" charset="0"/>
+                <a:cs typeface="Courier New" panose="02070309020205020404" pitchFamily="49" charset="0"/>
+              </a:rPr>
+              <a:t>...</a:t>
+            </a:r>
+          </a:p>
+        </p:txBody>
+      </p:sp>
+      <p:graphicFrame>
+        <p:nvGraphicFramePr>
+          <p:cNvPr id="8" name="Table 7">
+            <a:extLst>
+              <a:ext uri="{FF2B5EF4-FFF2-40B4-BE49-F238E27FC236}">
+                <a16:creationId xmlns:a16="http://schemas.microsoft.com/office/drawing/2014/main" id="{E3EC0688-8FD3-73F7-BE17-B9E889F0051D}"/>
+              </a:ext>
+            </a:extLst>
+          </p:cNvPr>
+          <p:cNvGraphicFramePr>
+            <a:graphicFrameLocks noGrp="1"/>
+          </p:cNvGraphicFramePr>
+          <p:nvPr>
+            <p:extLst>
+              <p:ext uri="{D42A27DB-BD31-4B8C-83A1-F6EECF244321}">
+                <p14:modId xmlns:p14="http://schemas.microsoft.com/office/powerpoint/2010/main" val="3069790462"/>
+              </p:ext>
+            </p:extLst>
+          </p:nvPr>
+        </p:nvGraphicFramePr>
+        <p:xfrm>
+          <a:off x="5247312" y="2961529"/>
+          <a:ext cx="2101444" cy="1543575"/>
+        </p:xfrm>
+        <a:graphic>
+          <a:graphicData uri="http://schemas.openxmlformats.org/drawingml/2006/table">
+            <a:tbl>
+              <a:tblPr/>
+              <a:tblGrid>
+                <a:gridCol w="525361">
+                  <a:extLst>
+                    <a:ext uri="{9D8B030D-6E8A-4147-A177-3AD203B41FA5}">
+                      <a16:colId xmlns:a16="http://schemas.microsoft.com/office/drawing/2014/main" val="520751035"/>
+                    </a:ext>
+                  </a:extLst>
+                </a:gridCol>
+                <a:gridCol w="525361">
+                  <a:extLst>
+                    <a:ext uri="{9D8B030D-6E8A-4147-A177-3AD203B41FA5}">
+                      <a16:colId xmlns:a16="http://schemas.microsoft.com/office/drawing/2014/main" val="162460214"/>
+                    </a:ext>
+                  </a:extLst>
+                </a:gridCol>
+                <a:gridCol w="525361">
+                  <a:extLst>
+                    <a:ext uri="{9D8B030D-6E8A-4147-A177-3AD203B41FA5}">
+                      <a16:colId xmlns:a16="http://schemas.microsoft.com/office/drawing/2014/main" val="1031040740"/>
+                    </a:ext>
+                  </a:extLst>
+                </a:gridCol>
+                <a:gridCol w="525361">
+                  <a:extLst>
+                    <a:ext uri="{9D8B030D-6E8A-4147-A177-3AD203B41FA5}">
+                      <a16:colId xmlns:a16="http://schemas.microsoft.com/office/drawing/2014/main" val="3881649973"/>
+                    </a:ext>
+                  </a:extLst>
+                </a:gridCol>
+              </a:tblGrid>
+              <a:tr h="514525">
+                <a:tc>
+                  <a:txBody>
+                    <a:bodyPr/>
+                    <a:lstStyle/>
+                    <a:p>
+                      <a:pPr algn="ctr"/>
+                      <a:r>
+                        <a:rPr lang="en-DE" dirty="0">
+                          <a:latin typeface="Courier New" panose="02070309020205020404" pitchFamily="49" charset="0"/>
+                          <a:cs typeface="Courier New" panose="02070309020205020404" pitchFamily="49" charset="0"/>
+                        </a:rPr>
+                        <a:t>0</a:t>
+                      </a:r>
+                    </a:p>
+                  </a:txBody>
+                  <a:tcPr anchor="ctr">
+                    <a:lnL w="12700" cmpd="sng">
+                      <a:solidFill>
+                        <a:schemeClr val="tx1"/>
+                      </a:solidFill>
+                      <a:prstDash val="solid"/>
+                    </a:lnL>
+                    <a:lnR w="12700" cap="flat" cmpd="sng" algn="ctr">
+                      <a:solidFill>
+                        <a:schemeClr val="tx1"/>
+                      </a:solidFill>
+                      <a:prstDash val="solid"/>
+                      <a:round/>
+                      <a:headEnd type="none" w="med" len="med"/>
+                      <a:tailEnd type="none" w="med" len="med"/>
+                    </a:lnR>
+                    <a:lnT w="12700" cmpd="sng">
+                      <a:solidFill>
+                        <a:schemeClr val="tx1"/>
+                      </a:solidFill>
+                      <a:prstDash val="solid"/>
+                    </a:lnT>
+                    <a:lnB w="12700" cmpd="sng">
+                      <a:solidFill>
+                        <a:schemeClr val="tx1"/>
+                      </a:solidFill>
+                      <a:prstDash val="solid"/>
+                    </a:lnB>
+                    <a:solidFill>
+                      <a:srgbClr val="808001"/>
+                    </a:solidFill>
+                  </a:tcPr>
+                </a:tc>
+                <a:tc>
+                  <a:txBody>
+                    <a:bodyPr/>
+                    <a:lstStyle/>
+                    <a:p>
+                      <a:pPr algn="ctr"/>
+                      <a:r>
+                        <a:rPr lang="en-DE" dirty="0">
+                          <a:latin typeface="Courier New" panose="02070309020205020404" pitchFamily="49" charset="0"/>
+                          <a:cs typeface="Courier New" panose="02070309020205020404" pitchFamily="49" charset="0"/>
+                        </a:rPr>
+                        <a:t>8</a:t>
+                      </a:r>
+                    </a:p>
+                  </a:txBody>
+                  <a:tcPr anchor="ctr">
+                    <a:lnL w="12700" cmpd="sng">
+                      <a:solidFill>
+                        <a:schemeClr val="tx1"/>
+                      </a:solidFill>
+                      <a:prstDash val="solid"/>
+                    </a:lnL>
+                    <a:lnR w="12700" cap="flat" cmpd="sng" algn="ctr">
+                      <a:solidFill>
+                        <a:schemeClr val="tx1"/>
+                      </a:solidFill>
+                      <a:prstDash val="solid"/>
+                      <a:round/>
+                      <a:headEnd type="none" w="med" len="med"/>
+                      <a:tailEnd type="none" w="med" len="med"/>
+                    </a:lnR>
+                    <a:lnT w="12700" cmpd="sng">
+                      <a:solidFill>
+                        <a:schemeClr val="tx1"/>
+                      </a:solidFill>
+                      <a:prstDash val="solid"/>
+                    </a:lnT>
+                    <a:lnB w="12700" cap="flat" cmpd="sng" algn="ctr">
+                      <a:solidFill>
+                        <a:schemeClr val="tx1"/>
+                      </a:solidFill>
+                      <a:prstDash val="solid"/>
+                      <a:round/>
+                      <a:headEnd type="none" w="med" len="med"/>
+                      <a:tailEnd type="none" w="med" len="med"/>
+                    </a:lnB>
+                    <a:solidFill>
+                      <a:srgbClr val="FFFF00"/>
+                    </a:solidFill>
+                  </a:tcPr>
+                </a:tc>
+                <a:tc>
+                  <a:txBody>
+                    <a:bodyPr/>
+                    <a:lstStyle/>
+                    <a:p>
+                      <a:pPr algn="ctr"/>
+                      <a:r>
+                        <a:rPr lang="en-DE" dirty="0">
+                          <a:latin typeface="Courier New" panose="02070309020205020404" pitchFamily="49" charset="0"/>
+                          <a:cs typeface="Courier New" panose="02070309020205020404" pitchFamily="49" charset="0"/>
+                        </a:rPr>
+                        <a:t>2</a:t>
+                      </a:r>
+                    </a:p>
+                  </a:txBody>
+                  <a:tcPr anchor="ctr">
+                    <a:lnL w="12700" cmpd="sng">
+                      <a:solidFill>
+                        <a:schemeClr val="tx1"/>
+                      </a:solidFill>
+                      <a:prstDash val="solid"/>
+                    </a:lnL>
+                    <a:lnR w="12700" cap="flat" cmpd="sng" algn="ctr">
+                      <a:solidFill>
+                        <a:schemeClr val="tx1"/>
+                      </a:solidFill>
+                      <a:prstDash val="solid"/>
+                      <a:round/>
+                      <a:headEnd type="none" w="med" len="med"/>
+                      <a:tailEnd type="none" w="med" len="med"/>
+                    </a:lnR>
+                    <a:lnT w="12700" cmpd="sng">
+                      <a:solidFill>
+                        <a:schemeClr val="tx1"/>
+                      </a:solidFill>
+                      <a:prstDash val="solid"/>
+                    </a:lnT>
+                    <a:lnB w="12700" cap="flat" cmpd="sng" algn="ctr">
+                      <a:solidFill>
+                        <a:schemeClr val="tx1"/>
+                      </a:solidFill>
+                      <a:prstDash val="solid"/>
+                      <a:round/>
+                      <a:headEnd type="none" w="med" len="med"/>
+                      <a:tailEnd type="none" w="med" len="med"/>
+                    </a:lnB>
+                    <a:solidFill>
+                      <a:srgbClr val="018000"/>
+                    </a:solidFill>
+                  </a:tcPr>
+                </a:tc>
+                <a:tc>
+                  <a:txBody>
+                    <a:bodyPr/>
+                    <a:lstStyle/>
+                    <a:p>
+                      <a:pPr algn="ctr"/>
+                      <a:r>
+                        <a:rPr lang="en-DE" dirty="0">
+                          <a:latin typeface="Courier New" panose="02070309020205020404" pitchFamily="49" charset="0"/>
+                          <a:cs typeface="Courier New" panose="02070309020205020404" pitchFamily="49" charset="0"/>
+                        </a:rPr>
+                        <a:t>42</a:t>
+                      </a:r>
+                    </a:p>
+                  </a:txBody>
+                  <a:tcPr anchor="ctr">
+                    <a:lnL w="12700" cmpd="sng">
+                      <a:solidFill>
+                        <a:schemeClr val="tx1"/>
+                      </a:solidFill>
+                      <a:prstDash val="solid"/>
+                    </a:lnL>
+                    <a:lnR w="12700" cmpd="sng">
+                      <a:solidFill>
+                        <a:schemeClr val="tx1"/>
+                      </a:solidFill>
+                      <a:prstDash val="solid"/>
+                    </a:lnR>
+                    <a:lnT w="12700" cmpd="sng">
+                      <a:solidFill>
+                        <a:schemeClr val="tx1"/>
+                      </a:solidFill>
+                      <a:prstDash val="solid"/>
+                    </a:lnT>
+                    <a:lnB w="12700" cap="flat" cmpd="sng" algn="ctr">
+                      <a:solidFill>
+                        <a:schemeClr val="tx1"/>
+                      </a:solidFill>
+                      <a:prstDash val="solid"/>
+                      <a:round/>
+                      <a:headEnd type="none" w="med" len="med"/>
+                      <a:tailEnd type="none" w="med" len="med"/>
+                    </a:lnB>
+                    <a:solidFill>
+                      <a:srgbClr val="00FFFF"/>
+                    </a:solidFill>
+                  </a:tcPr>
+                </a:tc>
+                <a:extLst>
+                  <a:ext uri="{0D108BD9-81ED-4DB2-BD59-A6C34878D82A}">
+                    <a16:rowId xmlns:a16="http://schemas.microsoft.com/office/drawing/2014/main" val="3835059969"/>
+                  </a:ext>
+                </a:extLst>
+              </a:tr>
+              <a:tr h="514525">
+                <a:tc>
+                  <a:txBody>
+                    <a:bodyPr/>
+                    <a:lstStyle/>
+                    <a:p>
+                      <a:pPr algn="ctr"/>
+                      <a:r>
+                        <a:rPr lang="en-DE" dirty="0">
+                          <a:latin typeface="Courier New" panose="02070309020205020404" pitchFamily="49" charset="0"/>
+                          <a:cs typeface="Courier New" panose="02070309020205020404" pitchFamily="49" charset="0"/>
+                        </a:rPr>
+                        <a:t>10</a:t>
+                      </a:r>
+                    </a:p>
+                  </a:txBody>
+                  <a:tcPr anchor="ctr">
+                    <a:lnL w="12700" cmpd="sng">
+                      <a:solidFill>
+                        <a:schemeClr val="tx1"/>
+                      </a:solidFill>
+                      <a:prstDash val="solid"/>
+                    </a:lnL>
+                    <a:lnR w="12700" cap="flat" cmpd="sng" algn="ctr">
+                      <a:solidFill>
+                        <a:schemeClr val="tx1"/>
+                      </a:solidFill>
+                      <a:prstDash val="solid"/>
+                      <a:round/>
+                      <a:headEnd type="none" w="med" len="med"/>
+                      <a:tailEnd type="none" w="med" len="med"/>
+                    </a:lnR>
+                    <a:lnT w="12700" cap="flat" cmpd="sng" algn="ctr">
+                      <a:solidFill>
+                        <a:schemeClr val="tx1"/>
+                      </a:solidFill>
+                      <a:prstDash val="solid"/>
+                      <a:round/>
+                      <a:headEnd type="none" w="med" len="med"/>
+                      <a:tailEnd type="none" w="med" len="med"/>
+                    </a:lnT>
+                    <a:lnB w="12700" cmpd="sng">
+                      <a:solidFill>
+                        <a:schemeClr val="tx1"/>
+                      </a:solidFill>
+                      <a:prstDash val="solid"/>
+                    </a:lnB>
+                    <a:solidFill>
+                      <a:srgbClr val="FF00FF"/>
+                    </a:solidFill>
+                  </a:tcPr>
+                </a:tc>
+                <a:tc>
+                  <a:txBody>
+                    <a:bodyPr/>
+                    <a:lstStyle/>
+                    <a:p>
+                      <a:pPr algn="ctr"/>
+                      <a:r>
+                        <a:rPr lang="en-DE" dirty="0">
+                          <a:latin typeface="Courier New" panose="02070309020205020404" pitchFamily="49" charset="0"/>
+                          <a:cs typeface="Courier New" panose="02070309020205020404" pitchFamily="49" charset="0"/>
+                        </a:rPr>
+                        <a:t>…</a:t>
+                      </a:r>
+                    </a:p>
+                  </a:txBody>
+                  <a:tcPr anchor="ctr">
+                    <a:lnL w="12700" cmpd="sng">
+                      <a:solidFill>
+                        <a:schemeClr val="tx1"/>
+                      </a:solidFill>
+                      <a:prstDash val="solid"/>
+                    </a:lnL>
+                    <a:lnR w="12700" cap="flat" cmpd="sng" algn="ctr">
+                      <a:solidFill>
+                        <a:schemeClr val="tx1"/>
+                      </a:solidFill>
+                      <a:prstDash val="solid"/>
+                      <a:round/>
+                      <a:headEnd type="none" w="med" len="med"/>
+                      <a:tailEnd type="none" w="med" len="med"/>
+                    </a:lnR>
+                    <a:lnT w="12700" cap="flat" cmpd="sng" algn="ctr">
+                      <a:solidFill>
+                        <a:schemeClr val="tx1"/>
+                      </a:solidFill>
+                      <a:prstDash val="solid"/>
+                      <a:round/>
+                      <a:headEnd type="none" w="med" len="med"/>
+                      <a:tailEnd type="none" w="med" len="med"/>
+                    </a:lnT>
+                    <a:lnB w="12700" cap="flat" cmpd="sng" algn="ctr">
+                      <a:solidFill>
+                        <a:schemeClr val="tx1"/>
+                      </a:solidFill>
+                      <a:prstDash val="solid"/>
+                      <a:round/>
+                      <a:headEnd type="none" w="med" len="med"/>
+                      <a:tailEnd type="none" w="med" len="med"/>
+                    </a:lnB>
+                  </a:tcPr>
+                </a:tc>
+                <a:tc>
+                  <a:txBody>
+                    <a:bodyPr/>
+                    <a:lstStyle/>
+                    <a:p>
+                      <a:pPr algn="ctr"/>
+                      <a:r>
+                        <a:rPr lang="en-DE" dirty="0">
+                          <a:latin typeface="Courier New" panose="02070309020205020404" pitchFamily="49" charset="0"/>
+                          <a:cs typeface="Courier New" panose="02070309020205020404" pitchFamily="49" charset="0"/>
+                        </a:rPr>
+                        <a:t>…</a:t>
+                      </a:r>
+                    </a:p>
+                  </a:txBody>
+                  <a:tcPr anchor="ctr">
+                    <a:lnL w="12700" cmpd="sng">
+                      <a:solidFill>
+                        <a:schemeClr val="tx1"/>
+                      </a:solidFill>
+                      <a:prstDash val="solid"/>
+                    </a:lnL>
+                    <a:lnR w="12700" cap="flat" cmpd="sng" algn="ctr">
+                      <a:solidFill>
+                        <a:schemeClr val="tx1"/>
+                      </a:solidFill>
+                      <a:prstDash val="solid"/>
+                      <a:round/>
+                      <a:headEnd type="none" w="med" len="med"/>
+                      <a:tailEnd type="none" w="med" len="med"/>
+                    </a:lnR>
+                    <a:lnT w="12700" cap="flat" cmpd="sng" algn="ctr">
+                      <a:solidFill>
+                        <a:schemeClr val="tx1"/>
+                      </a:solidFill>
+                      <a:prstDash val="solid"/>
+                      <a:round/>
+                      <a:headEnd type="none" w="med" len="med"/>
+                      <a:tailEnd type="none" w="med" len="med"/>
+                    </a:lnT>
+                    <a:lnB w="12700" cap="flat" cmpd="sng" algn="ctr">
+                      <a:solidFill>
+                        <a:schemeClr val="tx1"/>
+                      </a:solidFill>
+                      <a:prstDash val="solid"/>
+                      <a:round/>
+                      <a:headEnd type="none" w="med" len="med"/>
+                      <a:tailEnd type="none" w="med" len="med"/>
+                    </a:lnB>
+                  </a:tcPr>
+                </a:tc>
+                <a:tc>
+                  <a:txBody>
+                    <a:bodyPr/>
+                    <a:lstStyle/>
+                    <a:p>
+                      <a:pPr algn="ctr"/>
+                      <a:r>
+                        <a:rPr lang="en-DE" dirty="0">
+                          <a:latin typeface="Courier New" panose="02070309020205020404" pitchFamily="49" charset="0"/>
+                          <a:cs typeface="Courier New" panose="02070309020205020404" pitchFamily="49" charset="0"/>
+                        </a:rPr>
+                        <a:t>…</a:t>
+                      </a:r>
+                    </a:p>
+                  </a:txBody>
+                  <a:tcPr anchor="ctr">
+                    <a:lnL w="12700" cmpd="sng">
+                      <a:solidFill>
+                        <a:schemeClr val="tx1"/>
+                      </a:solidFill>
+                      <a:prstDash val="solid"/>
+                    </a:lnL>
+                    <a:lnR w="12700" cmpd="sng">
+                      <a:solidFill>
+                        <a:schemeClr val="tx1"/>
+                      </a:solidFill>
+                      <a:prstDash val="solid"/>
+                    </a:lnR>
+                    <a:lnT w="12700" cap="flat" cmpd="sng" algn="ctr">
+                      <a:solidFill>
+                        <a:schemeClr val="tx1"/>
+                      </a:solidFill>
+                      <a:prstDash val="solid"/>
+                      <a:round/>
+                      <a:headEnd type="none" w="med" len="med"/>
+                      <a:tailEnd type="none" w="med" len="med"/>
+                    </a:lnT>
+                    <a:lnB w="12700" cap="flat" cmpd="sng" algn="ctr">
+                      <a:solidFill>
+                        <a:schemeClr val="tx1"/>
+                      </a:solidFill>
+                      <a:prstDash val="solid"/>
+                      <a:round/>
+                      <a:headEnd type="none" w="med" len="med"/>
+                      <a:tailEnd type="none" w="med" len="med"/>
+                    </a:lnB>
+                  </a:tcPr>
+                </a:tc>
+                <a:extLst>
+                  <a:ext uri="{0D108BD9-81ED-4DB2-BD59-A6C34878D82A}">
+                    <a16:rowId xmlns:a16="http://schemas.microsoft.com/office/drawing/2014/main" val="3477651988"/>
+                  </a:ext>
+                </a:extLst>
+              </a:tr>
+              <a:tr h="514525">
+                <a:tc>
+                  <a:txBody>
+                    <a:bodyPr/>
+                    <a:lstStyle/>
+                    <a:p>
+                      <a:pPr algn="ctr"/>
+                      <a:r>
+                        <a:rPr lang="en-DE" dirty="0">
+                          <a:latin typeface="Courier New" panose="02070309020205020404" pitchFamily="49" charset="0"/>
+                          <a:cs typeface="Courier New" panose="02070309020205020404" pitchFamily="49" charset="0"/>
+                        </a:rPr>
+                        <a:t>…</a:t>
+                      </a:r>
+                    </a:p>
+                  </a:txBody>
+                  <a:tcPr anchor="ctr">
+                    <a:lnL w="12700" cmpd="sng">
+                      <a:solidFill>
+                        <a:schemeClr val="tx1"/>
+                      </a:solidFill>
+                      <a:prstDash val="solid"/>
+                    </a:lnL>
+                    <a:lnR w="12700" cap="flat" cmpd="sng" algn="ctr">
+                      <a:solidFill>
+                        <a:schemeClr val="tx1"/>
+                      </a:solidFill>
+                      <a:prstDash val="solid"/>
+                      <a:round/>
+                      <a:headEnd type="none" w="med" len="med"/>
+                      <a:tailEnd type="none" w="med" len="med"/>
+                    </a:lnR>
+                    <a:lnT w="12700" cap="flat" cmpd="sng" algn="ctr">
+                      <a:solidFill>
+                        <a:schemeClr val="tx1"/>
+                      </a:solidFill>
+                      <a:prstDash val="solid"/>
+                      <a:round/>
+                      <a:headEnd type="none" w="med" len="med"/>
+                      <a:tailEnd type="none" w="med" len="med"/>
+                    </a:lnT>
+                    <a:lnB w="12700" cmpd="sng">
+                      <a:solidFill>
+                        <a:schemeClr val="tx1"/>
+                      </a:solidFill>
+                      <a:prstDash val="solid"/>
+                    </a:lnB>
+                  </a:tcPr>
+                </a:tc>
+                <a:tc>
+                  <a:txBody>
+                    <a:bodyPr/>
+                    <a:lstStyle/>
+                    <a:p>
+                      <a:pPr algn="ctr"/>
+                      <a:r>
+                        <a:rPr lang="en-DE" dirty="0">
+                          <a:latin typeface="Courier New" panose="02070309020205020404" pitchFamily="49" charset="0"/>
+                          <a:cs typeface="Courier New" panose="02070309020205020404" pitchFamily="49" charset="0"/>
+                        </a:rPr>
+                        <a:t>…</a:t>
+                      </a:r>
+                    </a:p>
+                  </a:txBody>
+                  <a:tcPr anchor="ctr">
+                    <a:lnL w="12700" cmpd="sng">
+                      <a:solidFill>
+                        <a:schemeClr val="tx1"/>
+                      </a:solidFill>
+                      <a:prstDash val="solid"/>
+                    </a:lnL>
+                    <a:lnR w="12700" cap="flat" cmpd="sng" algn="ctr">
+                      <a:solidFill>
+                        <a:schemeClr val="tx1"/>
+                      </a:solidFill>
+                      <a:prstDash val="solid"/>
+                      <a:round/>
+                      <a:headEnd type="none" w="med" len="med"/>
+                      <a:tailEnd type="none" w="med" len="med"/>
+                    </a:lnR>
+                    <a:lnT w="12700" cap="flat" cmpd="sng" algn="ctr">
+                      <a:solidFill>
+                        <a:schemeClr val="tx1"/>
+                      </a:solidFill>
+                      <a:prstDash val="solid"/>
+                      <a:round/>
+                      <a:headEnd type="none" w="med" len="med"/>
+                      <a:tailEnd type="none" w="med" len="med"/>
+                    </a:lnT>
+                    <a:lnB w="12700" cmpd="sng">
+                      <a:solidFill>
+                        <a:schemeClr val="tx1"/>
+                      </a:solidFill>
+                      <a:prstDash val="solid"/>
+                    </a:lnB>
+                  </a:tcPr>
+                </a:tc>
+                <a:tc>
+                  <a:txBody>
+                    <a:bodyPr/>
+                    <a:lstStyle/>
+                    <a:p>
+                      <a:pPr algn="ctr"/>
+                      <a:r>
+                        <a:rPr lang="en-DE" dirty="0">
+                          <a:latin typeface="Courier New" panose="02070309020205020404" pitchFamily="49" charset="0"/>
+                          <a:cs typeface="Courier New" panose="02070309020205020404" pitchFamily="49" charset="0"/>
+                        </a:rPr>
+                        <a:t>…</a:t>
+                      </a:r>
+                    </a:p>
+                  </a:txBody>
+                  <a:tcPr anchor="ctr">
+                    <a:lnL w="12700" cmpd="sng">
+                      <a:solidFill>
+                        <a:schemeClr val="tx1"/>
+                      </a:solidFill>
+                      <a:prstDash val="solid"/>
+                    </a:lnL>
+                    <a:lnR w="12700" cap="flat" cmpd="sng" algn="ctr">
+                      <a:solidFill>
+                        <a:schemeClr val="tx1"/>
+                      </a:solidFill>
+                      <a:prstDash val="solid"/>
+                      <a:round/>
+                      <a:headEnd type="none" w="med" len="med"/>
+                      <a:tailEnd type="none" w="med" len="med"/>
+                    </a:lnR>
+                    <a:lnT w="12700" cap="flat" cmpd="sng" algn="ctr">
+                      <a:solidFill>
+                        <a:schemeClr val="tx1"/>
+                      </a:solidFill>
+                      <a:prstDash val="solid"/>
+                      <a:round/>
+                      <a:headEnd type="none" w="med" len="med"/>
+                      <a:tailEnd type="none" w="med" len="med"/>
+                    </a:lnT>
+                    <a:lnB w="12700" cmpd="sng">
+                      <a:solidFill>
+                        <a:schemeClr val="tx1"/>
+                      </a:solidFill>
+                      <a:prstDash val="solid"/>
+                    </a:lnB>
+                  </a:tcPr>
+                </a:tc>
+                <a:tc>
+                  <a:txBody>
+                    <a:bodyPr/>
+                    <a:lstStyle/>
+                    <a:p>
+                      <a:pPr algn="ctr"/>
+                      <a:r>
+                        <a:rPr lang="en-DE" dirty="0">
+                          <a:latin typeface="Courier New" panose="02070309020205020404" pitchFamily="49" charset="0"/>
+                          <a:cs typeface="Courier New" panose="02070309020205020404" pitchFamily="49" charset="0"/>
+                        </a:rPr>
+                        <a:t>…</a:t>
+                      </a:r>
+                    </a:p>
+                  </a:txBody>
+                  <a:tcPr anchor="ctr">
+                    <a:lnL w="12700" cmpd="sng">
+                      <a:solidFill>
+                        <a:schemeClr val="tx1"/>
+                      </a:solidFill>
+                      <a:prstDash val="solid"/>
+                    </a:lnL>
+                    <a:lnR w="12700" cmpd="sng">
+                      <a:solidFill>
+                        <a:schemeClr val="tx1"/>
+                      </a:solidFill>
+                      <a:prstDash val="solid"/>
+                    </a:lnR>
+                    <a:lnT w="12700" cap="flat" cmpd="sng" algn="ctr">
+                      <a:solidFill>
+                        <a:schemeClr val="tx1"/>
+                      </a:solidFill>
+                      <a:prstDash val="solid"/>
+                      <a:round/>
+                      <a:headEnd type="none" w="med" len="med"/>
+                      <a:tailEnd type="none" w="med" len="med"/>
+                    </a:lnT>
+                    <a:lnB w="12700" cmpd="sng">
+                      <a:solidFill>
+                        <a:schemeClr val="tx1"/>
+                      </a:solidFill>
+                      <a:prstDash val="solid"/>
+                    </a:lnB>
+                  </a:tcPr>
+                </a:tc>
+                <a:extLst>
+                  <a:ext uri="{0D108BD9-81ED-4DB2-BD59-A6C34878D82A}">
+                    <a16:rowId xmlns:a16="http://schemas.microsoft.com/office/drawing/2014/main" val="2002121677"/>
+                  </a:ext>
+                </a:extLst>
+              </a:tr>
+            </a:tbl>
+          </a:graphicData>
+        </a:graphic>
+      </p:graphicFrame>
+      <p:cxnSp>
+        <p:nvCxnSpPr>
+          <p:cNvPr id="12" name="Straight Connector 11">
+            <a:extLst>
+              <a:ext uri="{FF2B5EF4-FFF2-40B4-BE49-F238E27FC236}">
+                <a16:creationId xmlns:a16="http://schemas.microsoft.com/office/drawing/2014/main" id="{12EE391A-AEA5-77C5-42B9-74970F0D0BC9}"/>
+              </a:ext>
+            </a:extLst>
+          </p:cNvPr>
+          <p:cNvCxnSpPr>
+            <a:cxnSpLocks/>
+          </p:cNvCxnSpPr>
+          <p:nvPr/>
+        </p:nvCxnSpPr>
+        <p:spPr>
+          <a:xfrm>
+            <a:off x="4363673" y="889233"/>
+            <a:ext cx="0" cy="998290"/>
+          </a:xfrm>
+          <a:prstGeom prst="line">
+            <a:avLst/>
+          </a:prstGeom>
+        </p:spPr>
+        <p:style>
+          <a:lnRef idx="1">
+            <a:schemeClr val="dk1"/>
+          </a:lnRef>
+          <a:fillRef idx="0">
+            <a:schemeClr val="dk1"/>
+          </a:fillRef>
+          <a:effectRef idx="0">
+            <a:schemeClr val="dk1"/>
+          </a:effectRef>
+          <a:fontRef idx="minor">
+            <a:schemeClr val="tx1"/>
+          </a:fontRef>
+        </p:style>
+      </p:cxnSp>
+      <p:sp>
+        <p:nvSpPr>
+          <p:cNvPr id="15" name="TextBox 14">
+            <a:extLst>
+              <a:ext uri="{FF2B5EF4-FFF2-40B4-BE49-F238E27FC236}">
+                <a16:creationId xmlns:a16="http://schemas.microsoft.com/office/drawing/2014/main" id="{17A1C703-C25B-5E66-E37B-FA55F76553D8}"/>
+              </a:ext>
+            </a:extLst>
+          </p:cNvPr>
+          <p:cNvSpPr txBox="1"/>
+          <p:nvPr/>
+        </p:nvSpPr>
+        <p:spPr>
+          <a:xfrm>
+            <a:off x="1872651" y="1729266"/>
+            <a:ext cx="2934238" cy="2862322"/>
+          </a:xfrm>
+          <a:prstGeom prst="rect">
+            <a:avLst/>
+          </a:prstGeom>
+          <a:noFill/>
+        </p:spPr>
+        <p:txBody>
+          <a:bodyPr wrap="square" rtlCol="0">
+            <a:spAutoFit/>
+          </a:bodyPr>
+          <a:lstStyle/>
+          <a:p>
+            <a:pPr marL="285750" indent="-285750">
+              <a:buFont typeface="Arial" panose="020B0604020202020204" pitchFamily="34" charset="0"/>
+              <a:buChar char="•"/>
+            </a:pPr>
+            <a:r>
+              <a:rPr lang="en-GB" dirty="0"/>
+              <a:t>Pixel d</a:t>
+            </a:r>
+            <a:r>
+              <a:rPr lang="en-DE" dirty="0"/>
+              <a:t>ata start</a:t>
+            </a:r>
+          </a:p>
+          <a:p>
+            <a:pPr marL="285750" indent="-285750">
+              <a:buFont typeface="Arial" panose="020B0604020202020204" pitchFamily="34" charset="0"/>
+              <a:buChar char="•"/>
+            </a:pPr>
+            <a:r>
+              <a:rPr lang="en-DE" dirty="0"/>
+              <a:t>Data type (bit-depth)</a:t>
+            </a:r>
+          </a:p>
+          <a:p>
+            <a:pPr marL="285750" indent="-285750">
+              <a:buFont typeface="Arial" panose="020B0604020202020204" pitchFamily="34" charset="0"/>
+              <a:buChar char="•"/>
+            </a:pPr>
+            <a:r>
+              <a:rPr lang="en-GB" dirty="0"/>
+              <a:t>Image d</a:t>
+            </a:r>
+            <a:r>
+              <a:rPr lang="en-DE" dirty="0"/>
+              <a:t>imensions</a:t>
+            </a:r>
+          </a:p>
+          <a:p>
+            <a:pPr marL="285750" indent="-285750">
+              <a:buFont typeface="Arial" panose="020B0604020202020204" pitchFamily="34" charset="0"/>
+              <a:buChar char="•"/>
+            </a:pPr>
+            <a:r>
+              <a:rPr lang="en-DE" dirty="0"/>
+              <a:t>Compression</a:t>
+            </a:r>
+          </a:p>
+          <a:p>
+            <a:endParaRPr lang="en-DE" dirty="0"/>
+          </a:p>
+          <a:p>
+            <a:pPr marL="285750" indent="-285750">
+              <a:buFont typeface="Arial" panose="020B0604020202020204" pitchFamily="34" charset="0"/>
+              <a:buChar char="•"/>
+            </a:pPr>
+            <a:r>
+              <a:rPr lang="en-DE" dirty="0"/>
+              <a:t>Pixel physical size</a:t>
+            </a:r>
+          </a:p>
+          <a:p>
+            <a:pPr marL="285750" indent="-285750">
+              <a:buFont typeface="Arial" panose="020B0604020202020204" pitchFamily="34" charset="0"/>
+              <a:buChar char="•"/>
+            </a:pPr>
+            <a:r>
+              <a:rPr lang="en-DE" dirty="0"/>
+              <a:t>Microscope name</a:t>
+            </a:r>
+          </a:p>
+          <a:p>
+            <a:pPr marL="285750" indent="-285750">
+              <a:buFont typeface="Arial" panose="020B0604020202020204" pitchFamily="34" charset="0"/>
+              <a:buChar char="•"/>
+            </a:pPr>
+            <a:r>
+              <a:rPr lang="en-DE" dirty="0"/>
+              <a:t>…</a:t>
+            </a:r>
+          </a:p>
+          <a:p>
+            <a:pPr marL="285750" indent="-285750">
+              <a:buFont typeface="Arial" panose="020B0604020202020204" pitchFamily="34" charset="0"/>
+              <a:buChar char="•"/>
+            </a:pPr>
+            <a:endParaRPr lang="en-DE" dirty="0"/>
+          </a:p>
+          <a:p>
+            <a:endParaRPr lang="en-DE" dirty="0"/>
+          </a:p>
+        </p:txBody>
+      </p:sp>
+      <p:sp>
+        <p:nvSpPr>
+          <p:cNvPr id="16" name="TextBox 15">
+            <a:extLst>
+              <a:ext uri="{FF2B5EF4-FFF2-40B4-BE49-F238E27FC236}">
+                <a16:creationId xmlns:a16="http://schemas.microsoft.com/office/drawing/2014/main" id="{65D25340-5D88-CC17-DE6C-5DE35B3C89D2}"/>
+              </a:ext>
+            </a:extLst>
+          </p:cNvPr>
+          <p:cNvSpPr txBox="1"/>
+          <p:nvPr/>
+        </p:nvSpPr>
+        <p:spPr>
+          <a:xfrm>
+            <a:off x="6325460" y="817946"/>
+            <a:ext cx="620554" cy="369332"/>
+          </a:xfrm>
+          <a:prstGeom prst="rect">
+            <a:avLst/>
+          </a:prstGeom>
+          <a:noFill/>
+        </p:spPr>
+        <p:txBody>
+          <a:bodyPr wrap="none" rtlCol="0">
+            <a:spAutoFit/>
+          </a:bodyPr>
+          <a:lstStyle/>
+          <a:p>
+            <a:r>
+              <a:rPr lang="en-US" dirty="0"/>
+              <a:t>Data</a:t>
+            </a:r>
+            <a:endParaRPr lang="en-DE" dirty="0"/>
+          </a:p>
+        </p:txBody>
+      </p:sp>
+      <p:cxnSp>
+        <p:nvCxnSpPr>
+          <p:cNvPr id="18" name="Straight Arrow Connector 17">
+            <a:extLst>
+              <a:ext uri="{FF2B5EF4-FFF2-40B4-BE49-F238E27FC236}">
+                <a16:creationId xmlns:a16="http://schemas.microsoft.com/office/drawing/2014/main" id="{D5C42F14-2DF0-FBB0-8143-DFC3881AA522}"/>
+              </a:ext>
+            </a:extLst>
+          </p:cNvPr>
+          <p:cNvCxnSpPr>
+            <a:cxnSpLocks/>
+          </p:cNvCxnSpPr>
+          <p:nvPr/>
+        </p:nvCxnSpPr>
+        <p:spPr>
+          <a:xfrm flipV="1">
+            <a:off x="3691156" y="1729266"/>
+            <a:ext cx="654341" cy="211985"/>
+          </a:xfrm>
+          <a:prstGeom prst="straightConnector1">
+            <a:avLst/>
+          </a:prstGeom>
+          <a:ln>
+            <a:solidFill>
+              <a:schemeClr val="tx1"/>
+            </a:solidFill>
+            <a:tailEnd type="triangle"/>
+          </a:ln>
+        </p:spPr>
+        <p:style>
+          <a:lnRef idx="1">
+            <a:schemeClr val="accent1"/>
+          </a:lnRef>
+          <a:fillRef idx="0">
+            <a:schemeClr val="accent1"/>
+          </a:fillRef>
+          <a:effectRef idx="0">
+            <a:schemeClr val="accent1"/>
+          </a:effectRef>
+          <a:fontRef idx="minor">
+            <a:schemeClr val="tx1"/>
+          </a:fontRef>
+        </p:style>
+      </p:cxnSp>
+      <p:cxnSp>
+        <p:nvCxnSpPr>
+          <p:cNvPr id="19" name="Straight Arrow Connector 18">
+            <a:extLst>
+              <a:ext uri="{FF2B5EF4-FFF2-40B4-BE49-F238E27FC236}">
+                <a16:creationId xmlns:a16="http://schemas.microsoft.com/office/drawing/2014/main" id="{4BF93447-A444-6170-E75A-F7255D65D3AF}"/>
+              </a:ext>
+            </a:extLst>
+          </p:cNvPr>
+          <p:cNvCxnSpPr>
+            <a:cxnSpLocks/>
+          </p:cNvCxnSpPr>
+          <p:nvPr/>
+        </p:nvCxnSpPr>
+        <p:spPr>
+          <a:xfrm flipV="1">
+            <a:off x="4321097" y="1606492"/>
+            <a:ext cx="2101444" cy="562062"/>
+          </a:xfrm>
+          <a:prstGeom prst="straightConnector1">
+            <a:avLst/>
+          </a:prstGeom>
+          <a:ln>
+            <a:solidFill>
+              <a:schemeClr val="tx1"/>
+            </a:solidFill>
+            <a:tailEnd type="triangle"/>
+          </a:ln>
+        </p:spPr>
+        <p:style>
+          <a:lnRef idx="1">
+            <a:schemeClr val="accent1"/>
+          </a:lnRef>
+          <a:fillRef idx="0">
+            <a:schemeClr val="accent1"/>
+          </a:fillRef>
+          <a:effectRef idx="0">
+            <a:schemeClr val="accent1"/>
+          </a:effectRef>
+          <a:fontRef idx="minor">
+            <a:schemeClr val="tx1"/>
+          </a:fontRef>
+        </p:style>
+      </p:cxnSp>
+      <p:sp>
+        <p:nvSpPr>
+          <p:cNvPr id="25" name="TextBox 24">
+            <a:extLst>
+              <a:ext uri="{FF2B5EF4-FFF2-40B4-BE49-F238E27FC236}">
+                <a16:creationId xmlns:a16="http://schemas.microsoft.com/office/drawing/2014/main" id="{1453600C-776F-D19B-89A8-1A40805CC355}"/>
+              </a:ext>
+            </a:extLst>
+          </p:cNvPr>
+          <p:cNvSpPr txBox="1"/>
+          <p:nvPr/>
+        </p:nvSpPr>
+        <p:spPr>
+          <a:xfrm>
+            <a:off x="2467415" y="815839"/>
+            <a:ext cx="1095813" cy="369332"/>
+          </a:xfrm>
+          <a:prstGeom prst="rect">
+            <a:avLst/>
+          </a:prstGeom>
+          <a:noFill/>
+        </p:spPr>
+        <p:txBody>
+          <a:bodyPr wrap="none" rtlCol="0">
+            <a:spAutoFit/>
+          </a:bodyPr>
+          <a:lstStyle/>
+          <a:p>
+            <a:r>
+              <a:rPr lang="en-US" dirty="0"/>
+              <a:t>Metadata</a:t>
+            </a:r>
+            <a:endParaRPr lang="en-DE" dirty="0"/>
+          </a:p>
+        </p:txBody>
+      </p:sp>
+      <p:sp>
+        <p:nvSpPr>
+          <p:cNvPr id="27" name="TextBox 26">
+            <a:extLst>
+              <a:ext uri="{FF2B5EF4-FFF2-40B4-BE49-F238E27FC236}">
+                <a16:creationId xmlns:a16="http://schemas.microsoft.com/office/drawing/2014/main" id="{B663921E-E477-3769-B6C3-85244D05CFFF}"/>
+              </a:ext>
+            </a:extLst>
+          </p:cNvPr>
+          <p:cNvSpPr txBox="1"/>
+          <p:nvPr/>
+        </p:nvSpPr>
+        <p:spPr>
+          <a:xfrm>
+            <a:off x="5894007" y="2531718"/>
+            <a:ext cx="952151" cy="369332"/>
+          </a:xfrm>
+          <a:prstGeom prst="rect">
+            <a:avLst/>
+          </a:prstGeom>
+          <a:noFill/>
+        </p:spPr>
+        <p:txBody>
+          <a:bodyPr wrap="square">
+            <a:spAutoFit/>
+          </a:bodyPr>
+          <a:lstStyle/>
+          <a:p>
+            <a:r>
+              <a:rPr lang="en-US" dirty="0"/>
+              <a:t>Width</a:t>
+            </a:r>
+            <a:endParaRPr lang="en-DE" dirty="0"/>
+          </a:p>
+        </p:txBody>
+      </p:sp>
+      <p:sp>
+        <p:nvSpPr>
+          <p:cNvPr id="28" name="TextBox 27">
+            <a:extLst>
+              <a:ext uri="{FF2B5EF4-FFF2-40B4-BE49-F238E27FC236}">
+                <a16:creationId xmlns:a16="http://schemas.microsoft.com/office/drawing/2014/main" id="{D17D3038-3A1B-897A-E63E-FE937EB76EDE}"/>
+              </a:ext>
+            </a:extLst>
+          </p:cNvPr>
+          <p:cNvSpPr txBox="1"/>
+          <p:nvPr/>
+        </p:nvSpPr>
+        <p:spPr>
+          <a:xfrm rot="16200000">
+            <a:off x="4406423" y="3430088"/>
+            <a:ext cx="952151" cy="369332"/>
+          </a:xfrm>
+          <a:prstGeom prst="rect">
+            <a:avLst/>
+          </a:prstGeom>
+          <a:noFill/>
+        </p:spPr>
+        <p:txBody>
+          <a:bodyPr wrap="square">
+            <a:spAutoFit/>
+          </a:bodyPr>
+          <a:lstStyle/>
+          <a:p>
+            <a:r>
+              <a:rPr lang="en-US" dirty="0"/>
+              <a:t>Height</a:t>
+            </a:r>
+            <a:endParaRPr lang="en-DE" dirty="0"/>
+          </a:p>
+        </p:txBody>
+      </p:sp>
+      <p:cxnSp>
+        <p:nvCxnSpPr>
+          <p:cNvPr id="30" name="Straight Arrow Connector 29">
+            <a:extLst>
+              <a:ext uri="{FF2B5EF4-FFF2-40B4-BE49-F238E27FC236}">
+                <a16:creationId xmlns:a16="http://schemas.microsoft.com/office/drawing/2014/main" id="{96DB12F8-339F-0A2F-A059-A2B7FE19CBA3}"/>
+              </a:ext>
+            </a:extLst>
+          </p:cNvPr>
+          <p:cNvCxnSpPr>
+            <a:cxnSpLocks/>
+          </p:cNvCxnSpPr>
+          <p:nvPr/>
+        </p:nvCxnSpPr>
+        <p:spPr>
+          <a:xfrm>
+            <a:off x="4043494" y="2531718"/>
+            <a:ext cx="685581" cy="897282"/>
+          </a:xfrm>
+          <a:prstGeom prst="straightConnector1">
+            <a:avLst/>
+          </a:prstGeom>
+          <a:ln>
+            <a:solidFill>
+              <a:schemeClr val="tx1"/>
+            </a:solidFill>
+            <a:tailEnd type="triangle"/>
+          </a:ln>
+        </p:spPr>
+        <p:style>
+          <a:lnRef idx="1">
+            <a:schemeClr val="accent1"/>
+          </a:lnRef>
+          <a:fillRef idx="0">
+            <a:schemeClr val="accent1"/>
+          </a:fillRef>
+          <a:effectRef idx="0">
+            <a:schemeClr val="accent1"/>
+          </a:effectRef>
+          <a:fontRef idx="minor">
+            <a:schemeClr val="tx1"/>
+          </a:fontRef>
+        </p:style>
+      </p:cxnSp>
+      <p:cxnSp>
+        <p:nvCxnSpPr>
+          <p:cNvPr id="33" name="Straight Arrow Connector 32">
+            <a:extLst>
+              <a:ext uri="{FF2B5EF4-FFF2-40B4-BE49-F238E27FC236}">
+                <a16:creationId xmlns:a16="http://schemas.microsoft.com/office/drawing/2014/main" id="{5EAB8E7D-AEBF-D782-96BA-65ED56E43564}"/>
+              </a:ext>
+            </a:extLst>
+          </p:cNvPr>
+          <p:cNvCxnSpPr>
+            <a:cxnSpLocks/>
+            <a:endCxn id="27" idx="1"/>
+          </p:cNvCxnSpPr>
+          <p:nvPr/>
+        </p:nvCxnSpPr>
+        <p:spPr>
+          <a:xfrm>
+            <a:off x="4179266" y="2485346"/>
+            <a:ext cx="1714741" cy="231038"/>
+          </a:xfrm>
+          <a:prstGeom prst="straightConnector1">
+            <a:avLst/>
+          </a:prstGeom>
+          <a:ln>
+            <a:solidFill>
+              <a:schemeClr val="tx1"/>
+            </a:solidFill>
+            <a:tailEnd type="triangle"/>
+          </a:ln>
+        </p:spPr>
+        <p:style>
+          <a:lnRef idx="1">
+            <a:schemeClr val="accent1"/>
+          </a:lnRef>
+          <a:fillRef idx="0">
+            <a:schemeClr val="accent1"/>
+          </a:fillRef>
+          <a:effectRef idx="0">
+            <a:schemeClr val="accent1"/>
+          </a:effectRef>
+          <a:fontRef idx="minor">
+            <a:schemeClr val="tx1"/>
+          </a:fontRef>
+        </p:style>
+      </p:cxnSp>
+    </p:spTree>
+    <p:extLst>
+      <p:ext uri="{BB962C8B-B14F-4D97-AF65-F5344CB8AC3E}">
+        <p14:creationId xmlns:p14="http://schemas.microsoft.com/office/powerpoint/2010/main" val="1229276379"/>
+      </p:ext>
+    </p:extLst>
+  </p:cSld>
+  <p:clrMapOvr>
+    <a:masterClrMapping/>
+  </p:clrMapOvr>
+</p:sld>
+</file>
+
 <file path=ppt/theme/theme1.xml><?xml version="1.0" encoding="utf-8"?>
 <a:theme xmlns:a="http://schemas.openxmlformats.org/drawingml/2006/main" name="Office Theme">
   <a:themeElements>

</xml_diff>

<commit_message>
Improve image data formats figures
</commit_message>
<xml_diff>
--- a/figures/resources/image_file_formats.pptx
+++ b/figures/resources/image_file_formats.pptx
@@ -263,7 +263,7 @@
           <a:p>
             <a:fld id="{750C4F48-5AC2-ED47-9644-5F9E688EC8A9}" type="datetimeFigureOut">
               <a:rPr lang="de-DE" smtClean="0"/>
-              <a:t>16.09.24</a:t>
+              <a:t>14.11.24</a:t>
             </a:fld>
             <a:endParaRPr lang="de-DE"/>
           </a:p>
@@ -463,7 +463,7 @@
           <a:p>
             <a:fld id="{750C4F48-5AC2-ED47-9644-5F9E688EC8A9}" type="datetimeFigureOut">
               <a:rPr lang="de-DE" smtClean="0"/>
-              <a:t>16.09.24</a:t>
+              <a:t>14.11.24</a:t>
             </a:fld>
             <a:endParaRPr lang="de-DE"/>
           </a:p>
@@ -673,7 +673,7 @@
           <a:p>
             <a:fld id="{750C4F48-5AC2-ED47-9644-5F9E688EC8A9}" type="datetimeFigureOut">
               <a:rPr lang="de-DE" smtClean="0"/>
-              <a:t>16.09.24</a:t>
+              <a:t>14.11.24</a:t>
             </a:fld>
             <a:endParaRPr lang="de-DE"/>
           </a:p>
@@ -873,7 +873,7 @@
           <a:p>
             <a:fld id="{750C4F48-5AC2-ED47-9644-5F9E688EC8A9}" type="datetimeFigureOut">
               <a:rPr lang="de-DE" smtClean="0"/>
-              <a:t>16.09.24</a:t>
+              <a:t>14.11.24</a:t>
             </a:fld>
             <a:endParaRPr lang="de-DE"/>
           </a:p>
@@ -1149,7 +1149,7 @@
           <a:p>
             <a:fld id="{750C4F48-5AC2-ED47-9644-5F9E688EC8A9}" type="datetimeFigureOut">
               <a:rPr lang="de-DE" smtClean="0"/>
-              <a:t>16.09.24</a:t>
+              <a:t>14.11.24</a:t>
             </a:fld>
             <a:endParaRPr lang="de-DE"/>
           </a:p>
@@ -1417,7 +1417,7 @@
           <a:p>
             <a:fld id="{750C4F48-5AC2-ED47-9644-5F9E688EC8A9}" type="datetimeFigureOut">
               <a:rPr lang="de-DE" smtClean="0"/>
-              <a:t>16.09.24</a:t>
+              <a:t>14.11.24</a:t>
             </a:fld>
             <a:endParaRPr lang="de-DE"/>
           </a:p>
@@ -1832,7 +1832,7 @@
           <a:p>
             <a:fld id="{750C4F48-5AC2-ED47-9644-5F9E688EC8A9}" type="datetimeFigureOut">
               <a:rPr lang="de-DE" smtClean="0"/>
-              <a:t>16.09.24</a:t>
+              <a:t>14.11.24</a:t>
             </a:fld>
             <a:endParaRPr lang="de-DE"/>
           </a:p>
@@ -1974,7 +1974,7 @@
           <a:p>
             <a:fld id="{750C4F48-5AC2-ED47-9644-5F9E688EC8A9}" type="datetimeFigureOut">
               <a:rPr lang="de-DE" smtClean="0"/>
-              <a:t>16.09.24</a:t>
+              <a:t>14.11.24</a:t>
             </a:fld>
             <a:endParaRPr lang="de-DE"/>
           </a:p>
@@ -2087,7 +2087,7 @@
           <a:p>
             <a:fld id="{750C4F48-5AC2-ED47-9644-5F9E688EC8A9}" type="datetimeFigureOut">
               <a:rPr lang="de-DE" smtClean="0"/>
-              <a:t>16.09.24</a:t>
+              <a:t>14.11.24</a:t>
             </a:fld>
             <a:endParaRPr lang="de-DE"/>
           </a:p>
@@ -2400,7 +2400,7 @@
           <a:p>
             <a:fld id="{750C4F48-5AC2-ED47-9644-5F9E688EC8A9}" type="datetimeFigureOut">
               <a:rPr lang="de-DE" smtClean="0"/>
-              <a:t>16.09.24</a:t>
+              <a:t>14.11.24</a:t>
             </a:fld>
             <a:endParaRPr lang="de-DE"/>
           </a:p>
@@ -2689,7 +2689,7 @@
           <a:p>
             <a:fld id="{750C4F48-5AC2-ED47-9644-5F9E688EC8A9}" type="datetimeFigureOut">
               <a:rPr lang="de-DE" smtClean="0"/>
-              <a:t>16.09.24</a:t>
+              <a:t>14.11.24</a:t>
             </a:fld>
             <a:endParaRPr lang="de-DE"/>
           </a:p>
@@ -2932,7 +2932,7 @@
           <a:p>
             <a:fld id="{750C4F48-5AC2-ED47-9644-5F9E688EC8A9}" type="datetimeFigureOut">
               <a:rPr lang="de-DE" smtClean="0"/>
-              <a:t>16.09.24</a:t>
+              <a:t>14.11.24</a:t>
             </a:fld>
             <a:endParaRPr lang="de-DE"/>
           </a:p>
@@ -4404,7 +4404,7 @@
             </a:pPr>
             <a:r>
               <a:rPr lang="en-DE" dirty="0"/>
-              <a:t>Data type (bit-depth)</a:t>
+              <a:t>Pixel data type (bit-depth)</a:t>
             </a:r>
           </a:p>
           <a:p>
@@ -4572,8 +4572,8 @@
         </p:nvCxnSpPr>
         <p:spPr>
           <a:xfrm flipV="1">
-            <a:off x="4321097" y="1606492"/>
-            <a:ext cx="2101444" cy="562062"/>
+            <a:off x="4697832" y="1606492"/>
+            <a:ext cx="1724709" cy="569149"/>
           </a:xfrm>
           <a:prstGeom prst="straightConnector1">
             <a:avLst/>

</xml_diff>